<commit_message>
Upated FAQ section of README, updated acknowledgements on class 5 slides, corrected a few typos in the class 8 slides.
</commit_message>
<xml_diff>
--- a/slides/Pythonlearn-05-FunctionsAndPygame.pptx
+++ b/slides/Pythonlearn-05-FunctionsAndPygame.pptx
@@ -49,7 +49,7 @@
     <p:sldId id="306" r:id="rId40"/>
     <p:sldId id="308" r:id="rId41"/>
     <p:sldId id="330" r:id="rId42"/>
-    <p:sldId id="328" r:id="rId43"/>
+    <p:sldId id="331" r:id="rId43"/>
   </p:sldIdLst>
   <p:sldSz cx="16256000" cy="9144000"/>
   <p:notesSz cx="6858000" cy="9144000"/>
@@ -4496,7 +4496,7 @@
     </p:spTree>
     <p:extLst>
       <p:ext uri="{BB962C8B-B14F-4D97-AF65-F5344CB8AC3E}">
-        <p14:creationId xmlns:p14="http://schemas.microsoft.com/office/powerpoint/2010/main" val="1832673630"/>
+        <p14:creationId xmlns:p14="http://schemas.microsoft.com/office/powerpoint/2010/main" val="2399435051"/>
       </p:ext>
     </p:extLst>
   </p:cSld>
@@ -22534,7 +22534,63 @@
                   <a:srgbClr val="FFFFFF"/>
                 </a:solidFill>
               </a:rPr>
-              <a:t>Slides condensed into an 8 deck series aimed at younger learners in China by Jeremy Pedersen.</a:t>
+              <a:t>This deck uses the style and formatting of Charles R. Severance’s slides, but some of the content and code is borrowed from the wonderful book </a:t>
+            </a:r>
+            <a:r>
+              <a:rPr lang="en-US" sz="1800" i="1" dirty="0">
+                <a:solidFill>
+                  <a:srgbClr val="FFFFFF"/>
+                </a:solidFill>
+              </a:rPr>
+              <a:t>Making Games with Python &amp; </a:t>
+            </a:r>
+            <a:r>
+              <a:rPr lang="en-US" sz="1800" i="1" dirty="0" err="1">
+                <a:solidFill>
+                  <a:srgbClr val="FFFFFF"/>
+                </a:solidFill>
+              </a:rPr>
+              <a:t>Pygame</a:t>
+            </a:r>
+            <a:r>
+              <a:rPr lang="en-US" sz="1800" dirty="0">
+                <a:solidFill>
+                  <a:srgbClr val="FFFFFF"/>
+                </a:solidFill>
+              </a:rPr>
+              <a:t> by Al </a:t>
+            </a:r>
+            <a:r>
+              <a:rPr lang="en-US" sz="1800" dirty="0" err="1">
+                <a:solidFill>
+                  <a:srgbClr val="FFFFFF"/>
+                </a:solidFill>
+              </a:rPr>
+              <a:t>Sweigart</a:t>
+            </a:r>
+            <a:r>
+              <a:rPr lang="en-US" sz="1800" dirty="0">
+                <a:solidFill>
+                  <a:srgbClr val="FFFFFF"/>
+                </a:solidFill>
+              </a:rPr>
+              <a:t>. Like Charles Severance and Al </a:t>
+            </a:r>
+            <a:r>
+              <a:rPr lang="en-US" sz="1800" dirty="0" err="1">
+                <a:solidFill>
+                  <a:srgbClr val="FFFFFF"/>
+                </a:solidFill>
+              </a:rPr>
+              <a:t>Sweigart</a:t>
+            </a:r>
+            <a:r>
+              <a:rPr lang="en-US" sz="1800" dirty="0">
+                <a:solidFill>
+                  <a:srgbClr val="FFFFFF"/>
+                </a:solidFill>
+              </a:rPr>
+              <a:t>, I license these slides and all associated content under a CC license. </a:t>
             </a:r>
             <a:endParaRPr sz="1800" dirty="0">
               <a:solidFill>
@@ -22579,7 +22635,7 @@
     </p:spTree>
     <p:extLst>
       <p:ext uri="{BB962C8B-B14F-4D97-AF65-F5344CB8AC3E}">
-        <p14:creationId xmlns:p14="http://schemas.microsoft.com/office/powerpoint/2010/main" val="523246886"/>
+        <p14:creationId xmlns:p14="http://schemas.microsoft.com/office/powerpoint/2010/main" val="2393787024"/>
       </p:ext>
     </p:extLst>
   </p:cSld>

</xml_diff>